<commit_message>
adding garbage collection notes
</commit_message>
<xml_diff>
--- a/8/figures/Presentation6.pptx
+++ b/8/figures/Presentation6.pptx
@@ -6,6 +6,7 @@
   </p:sldMasterIdLst>
   <p:sldIdLst>
     <p:sldId id="256" r:id="rId2"/>
+    <p:sldId id="257" r:id="rId3"/>
   </p:sldIdLst>
   <p:sldSz cx="12192000" cy="6858000"/>
   <p:notesSz cx="6858000" cy="9144000"/>
@@ -104,6 +105,11 @@
       </a:defRPr>
     </a:lvl9pPr>
   </p:defaultTextStyle>
+  <p:extLst>
+    <p:ext uri="{EFAFB233-063F-42B5-8137-9DF3F51BA10A}">
+      <p15:sldGuideLst xmlns:p15="http://schemas.microsoft.com/office/powerpoint/2012/main"/>
+    </p:ext>
+  </p:extLst>
 </p:presentation>
 </file>
 
@@ -254,7 +260,7 @@
           <a:p>
             <a:fld id="{50EC250A-A5BF-664F-9C07-A4AD4600B60F}" type="datetimeFigureOut">
               <a:rPr lang="en-US" smtClean="0"/>
-              <a:t>10/20/20</a:t>
+              <a:t>10/21/20</a:t>
             </a:fld>
             <a:endParaRPr lang="en-US"/>
           </a:p>
@@ -452,7 +458,7 @@
           <a:p>
             <a:fld id="{50EC250A-A5BF-664F-9C07-A4AD4600B60F}" type="datetimeFigureOut">
               <a:rPr lang="en-US" smtClean="0"/>
-              <a:t>10/20/20</a:t>
+              <a:t>10/21/20</a:t>
             </a:fld>
             <a:endParaRPr lang="en-US"/>
           </a:p>
@@ -660,7 +666,7 @@
           <a:p>
             <a:fld id="{50EC250A-A5BF-664F-9C07-A4AD4600B60F}" type="datetimeFigureOut">
               <a:rPr lang="en-US" smtClean="0"/>
-              <a:t>10/20/20</a:t>
+              <a:t>10/21/20</a:t>
             </a:fld>
             <a:endParaRPr lang="en-US"/>
           </a:p>
@@ -858,7 +864,7 @@
           <a:p>
             <a:fld id="{50EC250A-A5BF-664F-9C07-A4AD4600B60F}" type="datetimeFigureOut">
               <a:rPr lang="en-US" smtClean="0"/>
-              <a:t>10/20/20</a:t>
+              <a:t>10/21/20</a:t>
             </a:fld>
             <a:endParaRPr lang="en-US"/>
           </a:p>
@@ -1133,7 +1139,7 @@
           <a:p>
             <a:fld id="{50EC250A-A5BF-664F-9C07-A4AD4600B60F}" type="datetimeFigureOut">
               <a:rPr lang="en-US" smtClean="0"/>
-              <a:t>10/20/20</a:t>
+              <a:t>10/21/20</a:t>
             </a:fld>
             <a:endParaRPr lang="en-US"/>
           </a:p>
@@ -1398,7 +1404,7 @@
           <a:p>
             <a:fld id="{50EC250A-A5BF-664F-9C07-A4AD4600B60F}" type="datetimeFigureOut">
               <a:rPr lang="en-US" smtClean="0"/>
-              <a:t>10/20/20</a:t>
+              <a:t>10/21/20</a:t>
             </a:fld>
             <a:endParaRPr lang="en-US"/>
           </a:p>
@@ -1810,7 +1816,7 @@
           <a:p>
             <a:fld id="{50EC250A-A5BF-664F-9C07-A4AD4600B60F}" type="datetimeFigureOut">
               <a:rPr lang="en-US" smtClean="0"/>
-              <a:t>10/20/20</a:t>
+              <a:t>10/21/20</a:t>
             </a:fld>
             <a:endParaRPr lang="en-US"/>
           </a:p>
@@ -1951,7 +1957,7 @@
           <a:p>
             <a:fld id="{50EC250A-A5BF-664F-9C07-A4AD4600B60F}" type="datetimeFigureOut">
               <a:rPr lang="en-US" smtClean="0"/>
-              <a:t>10/20/20</a:t>
+              <a:t>10/21/20</a:t>
             </a:fld>
             <a:endParaRPr lang="en-US"/>
           </a:p>
@@ -2064,7 +2070,7 @@
           <a:p>
             <a:fld id="{50EC250A-A5BF-664F-9C07-A4AD4600B60F}" type="datetimeFigureOut">
               <a:rPr lang="en-US" smtClean="0"/>
-              <a:t>10/20/20</a:t>
+              <a:t>10/21/20</a:t>
             </a:fld>
             <a:endParaRPr lang="en-US"/>
           </a:p>
@@ -2375,7 +2381,7 @@
           <a:p>
             <a:fld id="{50EC250A-A5BF-664F-9C07-A4AD4600B60F}" type="datetimeFigureOut">
               <a:rPr lang="en-US" smtClean="0"/>
-              <a:t>10/20/20</a:t>
+              <a:t>10/21/20</a:t>
             </a:fld>
             <a:endParaRPr lang="en-US"/>
           </a:p>
@@ -2663,7 +2669,7 @@
           <a:p>
             <a:fld id="{50EC250A-A5BF-664F-9C07-A4AD4600B60F}" type="datetimeFigureOut">
               <a:rPr lang="en-US" smtClean="0"/>
-              <a:t>10/20/20</a:t>
+              <a:t>10/21/20</a:t>
             </a:fld>
             <a:endParaRPr lang="en-US"/>
           </a:p>
@@ -2904,7 +2910,7 @@
           <a:p>
             <a:fld id="{50EC250A-A5BF-664F-9C07-A4AD4600B60F}" type="datetimeFigureOut">
               <a:rPr lang="en-US" smtClean="0"/>
-              <a:t>10/20/20</a:t>
+              <a:t>10/21/20</a:t>
             </a:fld>
             <a:endParaRPr lang="en-US"/>
           </a:p>
@@ -4065,10 +4071,1281 @@
           </a:fontRef>
         </p:style>
       </p:cxnSp>
+      <p:cxnSp>
+        <p:nvCxnSpPr>
+          <p:cNvPr id="3" name="Straight Arrow Connector 2">
+            <a:extLst>
+              <a:ext uri="{FF2B5EF4-FFF2-40B4-BE49-F238E27FC236}">
+                <a16:creationId xmlns:a16="http://schemas.microsoft.com/office/drawing/2014/main" id="{36642476-5287-0D48-B137-62E67AD7022B}"/>
+              </a:ext>
+            </a:extLst>
+          </p:cNvPr>
+          <p:cNvCxnSpPr/>
+          <p:nvPr/>
+        </p:nvCxnSpPr>
+        <p:spPr>
+          <a:xfrm>
+            <a:off x="3363310" y="830317"/>
+            <a:ext cx="914400" cy="914400"/>
+          </a:xfrm>
+          <a:prstGeom prst="straightConnector1">
+            <a:avLst/>
+          </a:prstGeom>
+          <a:ln>
+            <a:tailEnd type="triangle"/>
+          </a:ln>
+        </p:spPr>
+        <p:style>
+          <a:lnRef idx="1">
+            <a:schemeClr val="accent1"/>
+          </a:lnRef>
+          <a:fillRef idx="0">
+            <a:schemeClr val="accent1"/>
+          </a:fillRef>
+          <a:effectRef idx="0">
+            <a:schemeClr val="accent1"/>
+          </a:effectRef>
+          <a:fontRef idx="minor">
+            <a:schemeClr val="tx1"/>
+          </a:fontRef>
+        </p:style>
+      </p:cxnSp>
     </p:spTree>
     <p:extLst>
       <p:ext uri="{BB962C8B-B14F-4D97-AF65-F5344CB8AC3E}">
         <p14:creationId xmlns:p14="http://schemas.microsoft.com/office/powerpoint/2010/main" val="844341098"/>
+      </p:ext>
+    </p:extLst>
+  </p:cSld>
+  <p:clrMapOvr>
+    <a:masterClrMapping/>
+  </p:clrMapOvr>
+</p:sld>
+</file>
+
+<file path=ppt/slides/slide2.xml><?xml version="1.0" encoding="utf-8"?>
+<p:sld xmlns:a="http://schemas.openxmlformats.org/drawingml/2006/main" xmlns:r="http://schemas.openxmlformats.org/officeDocument/2006/relationships" xmlns:p="http://schemas.openxmlformats.org/presentationml/2006/main">
+  <p:cSld>
+    <p:spTree>
+      <p:nvGrpSpPr>
+        <p:cNvPr id="1" name=""/>
+        <p:cNvGrpSpPr/>
+        <p:nvPr/>
+      </p:nvGrpSpPr>
+      <p:grpSpPr>
+        <a:xfrm>
+          <a:off x="0" y="0"/>
+          <a:ext cx="0" cy="0"/>
+          <a:chOff x="0" y="0"/>
+          <a:chExt cx="0" cy="0"/>
+        </a:xfrm>
+      </p:grpSpPr>
+      <p:sp>
+        <p:nvSpPr>
+          <p:cNvPr id="4" name="TextBox 3">
+            <a:extLst>
+              <a:ext uri="{FF2B5EF4-FFF2-40B4-BE49-F238E27FC236}">
+                <a16:creationId xmlns:a16="http://schemas.microsoft.com/office/drawing/2014/main" id="{BA701B95-E8AD-894D-9012-100BD78F81D1}"/>
+              </a:ext>
+            </a:extLst>
+          </p:cNvPr>
+          <p:cNvSpPr txBox="1"/>
+          <p:nvPr/>
+        </p:nvSpPr>
+        <p:spPr>
+          <a:xfrm>
+            <a:off x="141888" y="500988"/>
+            <a:ext cx="1204304" cy="461665"/>
+          </a:xfrm>
+          <a:prstGeom prst="rect">
+            <a:avLst/>
+          </a:prstGeom>
+          <a:noFill/>
+        </p:spPr>
+        <p:txBody>
+          <a:bodyPr wrap="none" rtlCol="0">
+            <a:spAutoFit/>
+          </a:bodyPr>
+          <a:lstStyle/>
+          <a:p>
+            <a:r>
+              <a:rPr lang="en-US" sz="2400" b="1" dirty="0">
+                <a:highlight>
+                  <a:srgbClr val="FFFF00"/>
+                </a:highlight>
+                <a:latin typeface="Gill Sans Nova Light" panose="020B0602020104020203" pitchFamily="34" charset="0"/>
+              </a:rPr>
+              <a:t>x: Ref(0)</a:t>
+            </a:r>
+          </a:p>
+        </p:txBody>
+      </p:sp>
+      <p:sp>
+        <p:nvSpPr>
+          <p:cNvPr id="6" name="TextBox 5">
+            <a:extLst>
+              <a:ext uri="{FF2B5EF4-FFF2-40B4-BE49-F238E27FC236}">
+                <a16:creationId xmlns:a16="http://schemas.microsoft.com/office/drawing/2014/main" id="{9EAB39CD-1212-F342-9D52-E319C6332F55}"/>
+              </a:ext>
+            </a:extLst>
+          </p:cNvPr>
+          <p:cNvSpPr txBox="1"/>
+          <p:nvPr/>
+        </p:nvSpPr>
+        <p:spPr>
+          <a:xfrm>
+            <a:off x="141888" y="1461417"/>
+            <a:ext cx="1204304" cy="830997"/>
+          </a:xfrm>
+          <a:prstGeom prst="rect">
+            <a:avLst/>
+          </a:prstGeom>
+          <a:noFill/>
+        </p:spPr>
+        <p:txBody>
+          <a:bodyPr wrap="none" rtlCol="0">
+            <a:spAutoFit/>
+          </a:bodyPr>
+          <a:lstStyle/>
+          <a:p>
+            <a:r>
+              <a:rPr lang="en-US" sz="2400" b="1" dirty="0">
+                <a:highlight>
+                  <a:srgbClr val="FFFF00"/>
+                </a:highlight>
+                <a:latin typeface="Gill Sans Nova Light" panose="020B0602020104020203" pitchFamily="34" charset="0"/>
+              </a:rPr>
+              <a:t>x: Ref(0)</a:t>
+            </a:r>
+          </a:p>
+          <a:p>
+            <a:r>
+              <a:rPr lang="en-US" sz="2400" b="1" dirty="0">
+                <a:highlight>
+                  <a:srgbClr val="FFFF00"/>
+                </a:highlight>
+                <a:latin typeface="Gill Sans Nova Light" panose="020B0602020104020203" pitchFamily="34" charset="0"/>
+              </a:rPr>
+              <a:t>z: Ref(1)</a:t>
+            </a:r>
+          </a:p>
+        </p:txBody>
+      </p:sp>
+      <p:graphicFrame>
+        <p:nvGraphicFramePr>
+          <p:cNvPr id="7" name="Table 7">
+            <a:extLst>
+              <a:ext uri="{FF2B5EF4-FFF2-40B4-BE49-F238E27FC236}">
+                <a16:creationId xmlns:a16="http://schemas.microsoft.com/office/drawing/2014/main" id="{568D2DEE-5CD7-DF4E-91C6-2C1CD3A83D77}"/>
+              </a:ext>
+            </a:extLst>
+          </p:cNvPr>
+          <p:cNvGraphicFramePr>
+            <a:graphicFrameLocks noGrp="1"/>
+          </p:cNvGraphicFramePr>
+          <p:nvPr>
+            <p:extLst>
+              <p:ext uri="{D42A27DB-BD31-4B8C-83A1-F6EECF244321}">
+                <p14:modId xmlns:p14="http://schemas.microsoft.com/office/powerpoint/2010/main" val="2356301124"/>
+              </p:ext>
+            </p:extLst>
+          </p:nvPr>
+        </p:nvGraphicFramePr>
+        <p:xfrm>
+          <a:off x="1548524" y="345075"/>
+          <a:ext cx="4547476" cy="741680"/>
+        </p:xfrm>
+        <a:graphic>
+          <a:graphicData uri="http://schemas.openxmlformats.org/drawingml/2006/table">
+            <a:tbl>
+              <a:tblPr firstRow="1" bandRow="1">
+                <a:tableStyleId>{5C22544A-7EE6-4342-B048-85BDC9FD1C3A}</a:tableStyleId>
+              </a:tblPr>
+              <a:tblGrid>
+                <a:gridCol w="1058041">
+                  <a:extLst>
+                    <a:ext uri="{9D8B030D-6E8A-4147-A177-3AD203B41FA5}">
+                      <a16:colId xmlns:a16="http://schemas.microsoft.com/office/drawing/2014/main" val="3275597204"/>
+                    </a:ext>
+                  </a:extLst>
+                </a:gridCol>
+                <a:gridCol w="1566042">
+                  <a:extLst>
+                    <a:ext uri="{9D8B030D-6E8A-4147-A177-3AD203B41FA5}">
+                      <a16:colId xmlns:a16="http://schemas.microsoft.com/office/drawing/2014/main" val="3709253098"/>
+                    </a:ext>
+                  </a:extLst>
+                </a:gridCol>
+                <a:gridCol w="1923393">
+                  <a:extLst>
+                    <a:ext uri="{9D8B030D-6E8A-4147-A177-3AD203B41FA5}">
+                      <a16:colId xmlns:a16="http://schemas.microsoft.com/office/drawing/2014/main" val="3363109013"/>
+                    </a:ext>
+                  </a:extLst>
+                </a:gridCol>
+              </a:tblGrid>
+              <a:tr h="370840">
+                <a:tc>
+                  <a:txBody>
+                    <a:bodyPr/>
+                    <a:lstStyle/>
+                    <a:p>
+                      <a:r>
+                        <a:rPr lang="en-US" dirty="0"/>
+                        <a:t>Address</a:t>
+                      </a:r>
+                    </a:p>
+                  </a:txBody>
+                  <a:tcPr/>
+                </a:tc>
+                <a:tc>
+                  <a:txBody>
+                    <a:bodyPr/>
+                    <a:lstStyle/>
+                    <a:p>
+                      <a:r>
+                        <a:rPr lang="en-US" dirty="0"/>
+                        <a:t>Value</a:t>
+                      </a:r>
+                    </a:p>
+                  </a:txBody>
+                  <a:tcPr/>
+                </a:tc>
+                <a:tc>
+                  <a:txBody>
+                    <a:bodyPr/>
+                    <a:lstStyle/>
+                    <a:p>
+                      <a:r>
+                        <a:rPr lang="en-US" dirty="0"/>
+                        <a:t>Ref. Count</a:t>
+                      </a:r>
+                    </a:p>
+                  </a:txBody>
+                  <a:tcPr/>
+                </a:tc>
+                <a:extLst>
+                  <a:ext uri="{0D108BD9-81ED-4DB2-BD59-A6C34878D82A}">
+                    <a16:rowId xmlns:a16="http://schemas.microsoft.com/office/drawing/2014/main" val="2963666045"/>
+                  </a:ext>
+                </a:extLst>
+              </a:tr>
+              <a:tr h="370840">
+                <a:tc>
+                  <a:txBody>
+                    <a:bodyPr/>
+                    <a:lstStyle/>
+                    <a:p>
+                      <a:r>
+                        <a:rPr lang="en-US" dirty="0"/>
+                        <a:t>0</a:t>
+                      </a:r>
+                    </a:p>
+                  </a:txBody>
+                  <a:tcPr/>
+                </a:tc>
+                <a:tc>
+                  <a:txBody>
+                    <a:bodyPr/>
+                    <a:lstStyle/>
+                    <a:p>
+                      <a:r>
+                        <a:rPr lang="en-US" dirty="0"/>
+                        <a:t>10</a:t>
+                      </a:r>
+                    </a:p>
+                  </a:txBody>
+                  <a:tcPr/>
+                </a:tc>
+                <a:tc>
+                  <a:txBody>
+                    <a:bodyPr/>
+                    <a:lstStyle/>
+                    <a:p>
+                      <a:r>
+                        <a:rPr lang="en-US" dirty="0"/>
+                        <a:t>1</a:t>
+                      </a:r>
+                    </a:p>
+                  </a:txBody>
+                  <a:tcPr/>
+                </a:tc>
+                <a:extLst>
+                  <a:ext uri="{0D108BD9-81ED-4DB2-BD59-A6C34878D82A}">
+                    <a16:rowId xmlns:a16="http://schemas.microsoft.com/office/drawing/2014/main" val="2276613400"/>
+                  </a:ext>
+                </a:extLst>
+              </a:tr>
+            </a:tbl>
+          </a:graphicData>
+        </a:graphic>
+      </p:graphicFrame>
+      <p:graphicFrame>
+        <p:nvGraphicFramePr>
+          <p:cNvPr id="8" name="Table 7">
+            <a:extLst>
+              <a:ext uri="{FF2B5EF4-FFF2-40B4-BE49-F238E27FC236}">
+                <a16:creationId xmlns:a16="http://schemas.microsoft.com/office/drawing/2014/main" id="{03058935-FB72-B745-B42C-DF86330C8CD7}"/>
+              </a:ext>
+            </a:extLst>
+          </p:cNvPr>
+          <p:cNvGraphicFramePr>
+            <a:graphicFrameLocks noGrp="1"/>
+          </p:cNvGraphicFramePr>
+          <p:nvPr>
+            <p:extLst>
+              <p:ext uri="{D42A27DB-BD31-4B8C-83A1-F6EECF244321}">
+                <p14:modId xmlns:p14="http://schemas.microsoft.com/office/powerpoint/2010/main" val="1670706752"/>
+              </p:ext>
+            </p:extLst>
+          </p:nvPr>
+        </p:nvGraphicFramePr>
+        <p:xfrm>
+          <a:off x="1548524" y="1320656"/>
+          <a:ext cx="4547476" cy="1112520"/>
+        </p:xfrm>
+        <a:graphic>
+          <a:graphicData uri="http://schemas.openxmlformats.org/drawingml/2006/table">
+            <a:tbl>
+              <a:tblPr firstRow="1" bandRow="1">
+                <a:tableStyleId>{5C22544A-7EE6-4342-B048-85BDC9FD1C3A}</a:tableStyleId>
+              </a:tblPr>
+              <a:tblGrid>
+                <a:gridCol w="1058041">
+                  <a:extLst>
+                    <a:ext uri="{9D8B030D-6E8A-4147-A177-3AD203B41FA5}">
+                      <a16:colId xmlns:a16="http://schemas.microsoft.com/office/drawing/2014/main" val="3275597204"/>
+                    </a:ext>
+                  </a:extLst>
+                </a:gridCol>
+                <a:gridCol w="1566042">
+                  <a:extLst>
+                    <a:ext uri="{9D8B030D-6E8A-4147-A177-3AD203B41FA5}">
+                      <a16:colId xmlns:a16="http://schemas.microsoft.com/office/drawing/2014/main" val="3709253098"/>
+                    </a:ext>
+                  </a:extLst>
+                </a:gridCol>
+                <a:gridCol w="1923393">
+                  <a:extLst>
+                    <a:ext uri="{9D8B030D-6E8A-4147-A177-3AD203B41FA5}">
+                      <a16:colId xmlns:a16="http://schemas.microsoft.com/office/drawing/2014/main" val="3363109013"/>
+                    </a:ext>
+                  </a:extLst>
+                </a:gridCol>
+              </a:tblGrid>
+              <a:tr h="370840">
+                <a:tc>
+                  <a:txBody>
+                    <a:bodyPr/>
+                    <a:lstStyle/>
+                    <a:p>
+                      <a:r>
+                        <a:rPr lang="en-US" dirty="0"/>
+                        <a:t>Address</a:t>
+                      </a:r>
+                    </a:p>
+                  </a:txBody>
+                  <a:tcPr/>
+                </a:tc>
+                <a:tc>
+                  <a:txBody>
+                    <a:bodyPr/>
+                    <a:lstStyle/>
+                    <a:p>
+                      <a:r>
+                        <a:rPr lang="en-US" dirty="0"/>
+                        <a:t>Value</a:t>
+                      </a:r>
+                    </a:p>
+                  </a:txBody>
+                  <a:tcPr/>
+                </a:tc>
+                <a:tc>
+                  <a:txBody>
+                    <a:bodyPr/>
+                    <a:lstStyle/>
+                    <a:p>
+                      <a:r>
+                        <a:rPr lang="en-US" dirty="0"/>
+                        <a:t>Ref. Count</a:t>
+                      </a:r>
+                    </a:p>
+                  </a:txBody>
+                  <a:tcPr/>
+                </a:tc>
+                <a:extLst>
+                  <a:ext uri="{0D108BD9-81ED-4DB2-BD59-A6C34878D82A}">
+                    <a16:rowId xmlns:a16="http://schemas.microsoft.com/office/drawing/2014/main" val="2963666045"/>
+                  </a:ext>
+                </a:extLst>
+              </a:tr>
+              <a:tr h="370840">
+                <a:tc>
+                  <a:txBody>
+                    <a:bodyPr/>
+                    <a:lstStyle/>
+                    <a:p>
+                      <a:r>
+                        <a:rPr lang="en-US" dirty="0"/>
+                        <a:t>0</a:t>
+                      </a:r>
+                    </a:p>
+                  </a:txBody>
+                  <a:tcPr/>
+                </a:tc>
+                <a:tc>
+                  <a:txBody>
+                    <a:bodyPr/>
+                    <a:lstStyle/>
+                    <a:p>
+                      <a:r>
+                        <a:rPr lang="en-US" dirty="0"/>
+                        <a:t>10</a:t>
+                      </a:r>
+                    </a:p>
+                  </a:txBody>
+                  <a:tcPr/>
+                </a:tc>
+                <a:tc>
+                  <a:txBody>
+                    <a:bodyPr/>
+                    <a:lstStyle/>
+                    <a:p>
+                      <a:r>
+                        <a:rPr lang="en-US" dirty="0"/>
+                        <a:t>1</a:t>
+                      </a:r>
+                    </a:p>
+                  </a:txBody>
+                  <a:tcPr/>
+                </a:tc>
+                <a:extLst>
+                  <a:ext uri="{0D108BD9-81ED-4DB2-BD59-A6C34878D82A}">
+                    <a16:rowId xmlns:a16="http://schemas.microsoft.com/office/drawing/2014/main" val="2276613400"/>
+                  </a:ext>
+                </a:extLst>
+              </a:tr>
+              <a:tr h="370840">
+                <a:tc>
+                  <a:txBody>
+                    <a:bodyPr/>
+                    <a:lstStyle/>
+                    <a:p>
+                      <a:r>
+                        <a:rPr lang="en-US" dirty="0"/>
+                        <a:t>1</a:t>
+                      </a:r>
+                    </a:p>
+                  </a:txBody>
+                  <a:tcPr/>
+                </a:tc>
+                <a:tc>
+                  <a:txBody>
+                    <a:bodyPr/>
+                    <a:lstStyle/>
+                    <a:p>
+                      <a:r>
+                        <a:rPr lang="en-US" dirty="0"/>
+                        <a:t>15</a:t>
+                      </a:r>
+                    </a:p>
+                  </a:txBody>
+                  <a:tcPr/>
+                </a:tc>
+                <a:tc>
+                  <a:txBody>
+                    <a:bodyPr/>
+                    <a:lstStyle/>
+                    <a:p>
+                      <a:r>
+                        <a:rPr lang="en-US" dirty="0"/>
+                        <a:t>1</a:t>
+                      </a:r>
+                    </a:p>
+                  </a:txBody>
+                  <a:tcPr/>
+                </a:tc>
+                <a:extLst>
+                  <a:ext uri="{0D108BD9-81ED-4DB2-BD59-A6C34878D82A}">
+                    <a16:rowId xmlns:a16="http://schemas.microsoft.com/office/drawing/2014/main" val="476150846"/>
+                  </a:ext>
+                </a:extLst>
+              </a:tr>
+            </a:tbl>
+          </a:graphicData>
+        </a:graphic>
+      </p:graphicFrame>
+      <p:sp>
+        <p:nvSpPr>
+          <p:cNvPr id="9" name="TextBox 8">
+            <a:extLst>
+              <a:ext uri="{FF2B5EF4-FFF2-40B4-BE49-F238E27FC236}">
+                <a16:creationId xmlns:a16="http://schemas.microsoft.com/office/drawing/2014/main" id="{5F063037-2CA0-5E49-B68B-86D256F92B65}"/>
+              </a:ext>
+            </a:extLst>
+          </p:cNvPr>
+          <p:cNvSpPr txBox="1"/>
+          <p:nvPr/>
+        </p:nvSpPr>
+        <p:spPr>
+          <a:xfrm>
+            <a:off x="141888" y="2704576"/>
+            <a:ext cx="1204304" cy="830997"/>
+          </a:xfrm>
+          <a:prstGeom prst="rect">
+            <a:avLst/>
+          </a:prstGeom>
+          <a:noFill/>
+        </p:spPr>
+        <p:txBody>
+          <a:bodyPr wrap="none" rtlCol="0">
+            <a:spAutoFit/>
+          </a:bodyPr>
+          <a:lstStyle/>
+          <a:p>
+            <a:r>
+              <a:rPr lang="en-US" sz="2400" b="1" dirty="0">
+                <a:highlight>
+                  <a:srgbClr val="FFFF00"/>
+                </a:highlight>
+                <a:latin typeface="Gill Sans Nova Light" panose="020B0602020104020203" pitchFamily="34" charset="0"/>
+              </a:rPr>
+              <a:t>x: Ref(0)</a:t>
+            </a:r>
+          </a:p>
+          <a:p>
+            <a:r>
+              <a:rPr lang="en-US" sz="2400" b="1" dirty="0">
+                <a:highlight>
+                  <a:srgbClr val="FFFF00"/>
+                </a:highlight>
+                <a:latin typeface="Gill Sans Nova Light" panose="020B0602020104020203" pitchFamily="34" charset="0"/>
+              </a:rPr>
+              <a:t>z: Ref(1)</a:t>
+            </a:r>
+          </a:p>
+        </p:txBody>
+      </p:sp>
+      <p:graphicFrame>
+        <p:nvGraphicFramePr>
+          <p:cNvPr id="10" name="Table 9">
+            <a:extLst>
+              <a:ext uri="{FF2B5EF4-FFF2-40B4-BE49-F238E27FC236}">
+                <a16:creationId xmlns:a16="http://schemas.microsoft.com/office/drawing/2014/main" id="{AA1D9A4C-DD67-DC4A-BE95-6022B770C004}"/>
+              </a:ext>
+            </a:extLst>
+          </p:cNvPr>
+          <p:cNvGraphicFramePr>
+            <a:graphicFrameLocks noGrp="1"/>
+          </p:cNvGraphicFramePr>
+          <p:nvPr>
+            <p:extLst>
+              <p:ext uri="{D42A27DB-BD31-4B8C-83A1-F6EECF244321}">
+                <p14:modId xmlns:p14="http://schemas.microsoft.com/office/powerpoint/2010/main" val="1152425662"/>
+              </p:ext>
+            </p:extLst>
+          </p:nvPr>
+        </p:nvGraphicFramePr>
+        <p:xfrm>
+          <a:off x="1548524" y="2667077"/>
+          <a:ext cx="4547476" cy="1112520"/>
+        </p:xfrm>
+        <a:graphic>
+          <a:graphicData uri="http://schemas.openxmlformats.org/drawingml/2006/table">
+            <a:tbl>
+              <a:tblPr firstRow="1" bandRow="1">
+                <a:tableStyleId>{5C22544A-7EE6-4342-B048-85BDC9FD1C3A}</a:tableStyleId>
+              </a:tblPr>
+              <a:tblGrid>
+                <a:gridCol w="1058041">
+                  <a:extLst>
+                    <a:ext uri="{9D8B030D-6E8A-4147-A177-3AD203B41FA5}">
+                      <a16:colId xmlns:a16="http://schemas.microsoft.com/office/drawing/2014/main" val="3275597204"/>
+                    </a:ext>
+                  </a:extLst>
+                </a:gridCol>
+                <a:gridCol w="1566042">
+                  <a:extLst>
+                    <a:ext uri="{9D8B030D-6E8A-4147-A177-3AD203B41FA5}">
+                      <a16:colId xmlns:a16="http://schemas.microsoft.com/office/drawing/2014/main" val="3709253098"/>
+                    </a:ext>
+                  </a:extLst>
+                </a:gridCol>
+                <a:gridCol w="1923393">
+                  <a:extLst>
+                    <a:ext uri="{9D8B030D-6E8A-4147-A177-3AD203B41FA5}">
+                      <a16:colId xmlns:a16="http://schemas.microsoft.com/office/drawing/2014/main" val="3363109013"/>
+                    </a:ext>
+                  </a:extLst>
+                </a:gridCol>
+              </a:tblGrid>
+              <a:tr h="370840">
+                <a:tc>
+                  <a:txBody>
+                    <a:bodyPr/>
+                    <a:lstStyle/>
+                    <a:p>
+                      <a:r>
+                        <a:rPr lang="en-US" dirty="0"/>
+                        <a:t>Address</a:t>
+                      </a:r>
+                    </a:p>
+                  </a:txBody>
+                  <a:tcPr/>
+                </a:tc>
+                <a:tc>
+                  <a:txBody>
+                    <a:bodyPr/>
+                    <a:lstStyle/>
+                    <a:p>
+                      <a:r>
+                        <a:rPr lang="en-US" dirty="0"/>
+                        <a:t>Value</a:t>
+                      </a:r>
+                    </a:p>
+                  </a:txBody>
+                  <a:tcPr/>
+                </a:tc>
+                <a:tc>
+                  <a:txBody>
+                    <a:bodyPr/>
+                    <a:lstStyle/>
+                    <a:p>
+                      <a:r>
+                        <a:rPr lang="en-US" dirty="0"/>
+                        <a:t>Ref. Count</a:t>
+                      </a:r>
+                    </a:p>
+                  </a:txBody>
+                  <a:tcPr/>
+                </a:tc>
+                <a:extLst>
+                  <a:ext uri="{0D108BD9-81ED-4DB2-BD59-A6C34878D82A}">
+                    <a16:rowId xmlns:a16="http://schemas.microsoft.com/office/drawing/2014/main" val="2963666045"/>
+                  </a:ext>
+                </a:extLst>
+              </a:tr>
+              <a:tr h="370840">
+                <a:tc>
+                  <a:txBody>
+                    <a:bodyPr/>
+                    <a:lstStyle/>
+                    <a:p>
+                      <a:r>
+                        <a:rPr lang="en-US" dirty="0"/>
+                        <a:t>0</a:t>
+                      </a:r>
+                    </a:p>
+                  </a:txBody>
+                  <a:tcPr/>
+                </a:tc>
+                <a:tc>
+                  <a:txBody>
+                    <a:bodyPr/>
+                    <a:lstStyle/>
+                    <a:p>
+                      <a:r>
+                        <a:rPr lang="en-US" dirty="0"/>
+                        <a:t>10</a:t>
+                      </a:r>
+                    </a:p>
+                  </a:txBody>
+                  <a:tcPr/>
+                </a:tc>
+                <a:tc>
+                  <a:txBody>
+                    <a:bodyPr/>
+                    <a:lstStyle/>
+                    <a:p>
+                      <a:r>
+                        <a:rPr lang="en-US" dirty="0"/>
+                        <a:t>1</a:t>
+                      </a:r>
+                    </a:p>
+                  </a:txBody>
+                  <a:tcPr/>
+                </a:tc>
+                <a:extLst>
+                  <a:ext uri="{0D108BD9-81ED-4DB2-BD59-A6C34878D82A}">
+                    <a16:rowId xmlns:a16="http://schemas.microsoft.com/office/drawing/2014/main" val="2276613400"/>
+                  </a:ext>
+                </a:extLst>
+              </a:tr>
+              <a:tr h="370840">
+                <a:tc>
+                  <a:txBody>
+                    <a:bodyPr/>
+                    <a:lstStyle/>
+                    <a:p>
+                      <a:r>
+                        <a:rPr lang="en-US" dirty="0"/>
+                        <a:t>1</a:t>
+                      </a:r>
+                    </a:p>
+                  </a:txBody>
+                  <a:tcPr/>
+                </a:tc>
+                <a:tc>
+                  <a:txBody>
+                    <a:bodyPr/>
+                    <a:lstStyle/>
+                    <a:p>
+                      <a:r>
+                        <a:rPr lang="en-US" dirty="0"/>
+                        <a:t>5</a:t>
+                      </a:r>
+                    </a:p>
+                  </a:txBody>
+                  <a:tcPr/>
+                </a:tc>
+                <a:tc>
+                  <a:txBody>
+                    <a:bodyPr/>
+                    <a:lstStyle/>
+                    <a:p>
+                      <a:r>
+                        <a:rPr lang="en-US" dirty="0"/>
+                        <a:t>1</a:t>
+                      </a:r>
+                    </a:p>
+                  </a:txBody>
+                  <a:tcPr/>
+                </a:tc>
+                <a:extLst>
+                  <a:ext uri="{0D108BD9-81ED-4DB2-BD59-A6C34878D82A}">
+                    <a16:rowId xmlns:a16="http://schemas.microsoft.com/office/drawing/2014/main" val="476150846"/>
+                  </a:ext>
+                </a:extLst>
+              </a:tr>
+            </a:tbl>
+          </a:graphicData>
+        </a:graphic>
+      </p:graphicFrame>
+      <p:sp>
+        <p:nvSpPr>
+          <p:cNvPr id="11" name="TextBox 10">
+            <a:extLst>
+              <a:ext uri="{FF2B5EF4-FFF2-40B4-BE49-F238E27FC236}">
+                <a16:creationId xmlns:a16="http://schemas.microsoft.com/office/drawing/2014/main" id="{F6A71C16-ABAA-B648-A1DA-D13906087564}"/>
+              </a:ext>
+            </a:extLst>
+          </p:cNvPr>
+          <p:cNvSpPr txBox="1"/>
+          <p:nvPr/>
+        </p:nvSpPr>
+        <p:spPr>
+          <a:xfrm>
+            <a:off x="141888" y="4106980"/>
+            <a:ext cx="1204304" cy="830997"/>
+          </a:xfrm>
+          <a:prstGeom prst="rect">
+            <a:avLst/>
+          </a:prstGeom>
+          <a:noFill/>
+        </p:spPr>
+        <p:txBody>
+          <a:bodyPr wrap="none" rtlCol="0">
+            <a:spAutoFit/>
+          </a:bodyPr>
+          <a:lstStyle/>
+          <a:p>
+            <a:r>
+              <a:rPr lang="en-US" sz="2400" b="1" dirty="0">
+                <a:highlight>
+                  <a:srgbClr val="FFFF00"/>
+                </a:highlight>
+                <a:latin typeface="Gill Sans Nova Light" panose="020B0602020104020203" pitchFamily="34" charset="0"/>
+              </a:rPr>
+              <a:t>x: Ref(0)</a:t>
+            </a:r>
+          </a:p>
+          <a:p>
+            <a:r>
+              <a:rPr lang="en-US" sz="2400" b="1" strike="sngStrike" dirty="0">
+                <a:highlight>
+                  <a:srgbClr val="FFFF00"/>
+                </a:highlight>
+                <a:latin typeface="Gill Sans Nova Light" panose="020B0602020104020203" pitchFamily="34" charset="0"/>
+              </a:rPr>
+              <a:t>z: Ref(1)</a:t>
+            </a:r>
+          </a:p>
+        </p:txBody>
+      </p:sp>
+      <p:graphicFrame>
+        <p:nvGraphicFramePr>
+          <p:cNvPr id="12" name="Table 11">
+            <a:extLst>
+              <a:ext uri="{FF2B5EF4-FFF2-40B4-BE49-F238E27FC236}">
+                <a16:creationId xmlns:a16="http://schemas.microsoft.com/office/drawing/2014/main" id="{7A274985-B49B-D443-ADDF-A68268D1DEB6}"/>
+              </a:ext>
+            </a:extLst>
+          </p:cNvPr>
+          <p:cNvGraphicFramePr>
+            <a:graphicFrameLocks noGrp="1"/>
+          </p:cNvGraphicFramePr>
+          <p:nvPr>
+            <p:extLst>
+              <p:ext uri="{D42A27DB-BD31-4B8C-83A1-F6EECF244321}">
+                <p14:modId xmlns:p14="http://schemas.microsoft.com/office/powerpoint/2010/main" val="1621203319"/>
+              </p:ext>
+            </p:extLst>
+          </p:nvPr>
+        </p:nvGraphicFramePr>
+        <p:xfrm>
+          <a:off x="1548524" y="4106980"/>
+          <a:ext cx="4547476" cy="1112520"/>
+        </p:xfrm>
+        <a:graphic>
+          <a:graphicData uri="http://schemas.openxmlformats.org/drawingml/2006/table">
+            <a:tbl>
+              <a:tblPr firstRow="1" bandRow="1">
+                <a:tableStyleId>{5C22544A-7EE6-4342-B048-85BDC9FD1C3A}</a:tableStyleId>
+              </a:tblPr>
+              <a:tblGrid>
+                <a:gridCol w="1058041">
+                  <a:extLst>
+                    <a:ext uri="{9D8B030D-6E8A-4147-A177-3AD203B41FA5}">
+                      <a16:colId xmlns:a16="http://schemas.microsoft.com/office/drawing/2014/main" val="3275597204"/>
+                    </a:ext>
+                  </a:extLst>
+                </a:gridCol>
+                <a:gridCol w="1566042">
+                  <a:extLst>
+                    <a:ext uri="{9D8B030D-6E8A-4147-A177-3AD203B41FA5}">
+                      <a16:colId xmlns:a16="http://schemas.microsoft.com/office/drawing/2014/main" val="3709253098"/>
+                    </a:ext>
+                  </a:extLst>
+                </a:gridCol>
+                <a:gridCol w="1923393">
+                  <a:extLst>
+                    <a:ext uri="{9D8B030D-6E8A-4147-A177-3AD203B41FA5}">
+                      <a16:colId xmlns:a16="http://schemas.microsoft.com/office/drawing/2014/main" val="3363109013"/>
+                    </a:ext>
+                  </a:extLst>
+                </a:gridCol>
+              </a:tblGrid>
+              <a:tr h="370840">
+                <a:tc>
+                  <a:txBody>
+                    <a:bodyPr/>
+                    <a:lstStyle/>
+                    <a:p>
+                      <a:r>
+                        <a:rPr lang="en-US" dirty="0"/>
+                        <a:t>Address</a:t>
+                      </a:r>
+                    </a:p>
+                  </a:txBody>
+                  <a:tcPr/>
+                </a:tc>
+                <a:tc>
+                  <a:txBody>
+                    <a:bodyPr/>
+                    <a:lstStyle/>
+                    <a:p>
+                      <a:r>
+                        <a:rPr lang="en-US" dirty="0"/>
+                        <a:t>Value</a:t>
+                      </a:r>
+                    </a:p>
+                  </a:txBody>
+                  <a:tcPr/>
+                </a:tc>
+                <a:tc>
+                  <a:txBody>
+                    <a:bodyPr/>
+                    <a:lstStyle/>
+                    <a:p>
+                      <a:r>
+                        <a:rPr lang="en-US" dirty="0"/>
+                        <a:t>Ref. Count</a:t>
+                      </a:r>
+                    </a:p>
+                  </a:txBody>
+                  <a:tcPr/>
+                </a:tc>
+                <a:extLst>
+                  <a:ext uri="{0D108BD9-81ED-4DB2-BD59-A6C34878D82A}">
+                    <a16:rowId xmlns:a16="http://schemas.microsoft.com/office/drawing/2014/main" val="2963666045"/>
+                  </a:ext>
+                </a:extLst>
+              </a:tr>
+              <a:tr h="370840">
+                <a:tc>
+                  <a:txBody>
+                    <a:bodyPr/>
+                    <a:lstStyle/>
+                    <a:p>
+                      <a:r>
+                        <a:rPr lang="en-US" dirty="0"/>
+                        <a:t>0</a:t>
+                      </a:r>
+                    </a:p>
+                  </a:txBody>
+                  <a:tcPr/>
+                </a:tc>
+                <a:tc>
+                  <a:txBody>
+                    <a:bodyPr/>
+                    <a:lstStyle/>
+                    <a:p>
+                      <a:r>
+                        <a:rPr lang="en-US" dirty="0"/>
+                        <a:t>10</a:t>
+                      </a:r>
+                    </a:p>
+                  </a:txBody>
+                  <a:tcPr/>
+                </a:tc>
+                <a:tc>
+                  <a:txBody>
+                    <a:bodyPr/>
+                    <a:lstStyle/>
+                    <a:p>
+                      <a:r>
+                        <a:rPr lang="en-US" dirty="0"/>
+                        <a:t>1</a:t>
+                      </a:r>
+                    </a:p>
+                  </a:txBody>
+                  <a:tcPr/>
+                </a:tc>
+                <a:extLst>
+                  <a:ext uri="{0D108BD9-81ED-4DB2-BD59-A6C34878D82A}">
+                    <a16:rowId xmlns:a16="http://schemas.microsoft.com/office/drawing/2014/main" val="2276613400"/>
+                  </a:ext>
+                </a:extLst>
+              </a:tr>
+              <a:tr h="370840">
+                <a:tc>
+                  <a:txBody>
+                    <a:bodyPr/>
+                    <a:lstStyle/>
+                    <a:p>
+                      <a:r>
+                        <a:rPr lang="en-US" dirty="0"/>
+                        <a:t>1</a:t>
+                      </a:r>
+                    </a:p>
+                  </a:txBody>
+                  <a:tcPr/>
+                </a:tc>
+                <a:tc>
+                  <a:txBody>
+                    <a:bodyPr/>
+                    <a:lstStyle/>
+                    <a:p>
+                      <a:r>
+                        <a:rPr lang="en-US" dirty="0"/>
+                        <a:t>5</a:t>
+                      </a:r>
+                    </a:p>
+                  </a:txBody>
+                  <a:tcPr/>
+                </a:tc>
+                <a:tc>
+                  <a:txBody>
+                    <a:bodyPr/>
+                    <a:lstStyle/>
+                    <a:p>
+                      <a:r>
+                        <a:rPr lang="en-US" dirty="0">
+                          <a:solidFill>
+                            <a:srgbClr val="FF0000"/>
+                          </a:solidFill>
+                        </a:rPr>
+                        <a:t>0</a:t>
+                      </a:r>
+                    </a:p>
+                  </a:txBody>
+                  <a:tcPr/>
+                </a:tc>
+                <a:extLst>
+                  <a:ext uri="{0D108BD9-81ED-4DB2-BD59-A6C34878D82A}">
+                    <a16:rowId xmlns:a16="http://schemas.microsoft.com/office/drawing/2014/main" val="476150846"/>
+                  </a:ext>
+                </a:extLst>
+              </a:tr>
+            </a:tbl>
+          </a:graphicData>
+        </a:graphic>
+      </p:graphicFrame>
+      <p:sp>
+        <p:nvSpPr>
+          <p:cNvPr id="13" name="TextBox 12">
+            <a:extLst>
+              <a:ext uri="{FF2B5EF4-FFF2-40B4-BE49-F238E27FC236}">
+                <a16:creationId xmlns:a16="http://schemas.microsoft.com/office/drawing/2014/main" id="{5B3CC5F2-7B10-6742-AA0B-566F85D02B94}"/>
+              </a:ext>
+            </a:extLst>
+          </p:cNvPr>
+          <p:cNvSpPr txBox="1"/>
+          <p:nvPr/>
+        </p:nvSpPr>
+        <p:spPr>
+          <a:xfrm>
+            <a:off x="129185" y="5658075"/>
+            <a:ext cx="1204304" cy="830997"/>
+          </a:xfrm>
+          <a:prstGeom prst="rect">
+            <a:avLst/>
+          </a:prstGeom>
+          <a:noFill/>
+        </p:spPr>
+        <p:txBody>
+          <a:bodyPr wrap="none" rtlCol="0">
+            <a:spAutoFit/>
+          </a:bodyPr>
+          <a:lstStyle/>
+          <a:p>
+            <a:r>
+              <a:rPr lang="en-US" sz="2400" b="1" dirty="0">
+                <a:highlight>
+                  <a:srgbClr val="FFFF00"/>
+                </a:highlight>
+                <a:latin typeface="Gill Sans Nova Light" panose="020B0602020104020203" pitchFamily="34" charset="0"/>
+              </a:rPr>
+              <a:t>x: Ref(0)</a:t>
+            </a:r>
+          </a:p>
+          <a:p>
+            <a:r>
+              <a:rPr lang="en-US" sz="2400" b="1" dirty="0">
+                <a:highlight>
+                  <a:srgbClr val="FFFF00"/>
+                </a:highlight>
+                <a:latin typeface="Gill Sans Nova Light" panose="020B0602020104020203" pitchFamily="34" charset="0"/>
+              </a:rPr>
+              <a:t>y: Ref(1)</a:t>
+            </a:r>
+          </a:p>
+        </p:txBody>
+      </p:sp>
+      <p:graphicFrame>
+        <p:nvGraphicFramePr>
+          <p:cNvPr id="15" name="Table 14">
+            <a:extLst>
+              <a:ext uri="{FF2B5EF4-FFF2-40B4-BE49-F238E27FC236}">
+                <a16:creationId xmlns:a16="http://schemas.microsoft.com/office/drawing/2014/main" id="{F3AD37F6-209F-7145-BD00-C674D9AB0128}"/>
+              </a:ext>
+            </a:extLst>
+          </p:cNvPr>
+          <p:cNvGraphicFramePr>
+            <a:graphicFrameLocks noGrp="1"/>
+          </p:cNvGraphicFramePr>
+          <p:nvPr>
+            <p:extLst>
+              <p:ext uri="{D42A27DB-BD31-4B8C-83A1-F6EECF244321}">
+                <p14:modId xmlns:p14="http://schemas.microsoft.com/office/powerpoint/2010/main" val="516905465"/>
+              </p:ext>
+            </p:extLst>
+          </p:nvPr>
+        </p:nvGraphicFramePr>
+        <p:xfrm>
+          <a:off x="1548524" y="5658075"/>
+          <a:ext cx="4547476" cy="1112520"/>
+        </p:xfrm>
+        <a:graphic>
+          <a:graphicData uri="http://schemas.openxmlformats.org/drawingml/2006/table">
+            <a:tbl>
+              <a:tblPr firstRow="1" bandRow="1">
+                <a:tableStyleId>{5C22544A-7EE6-4342-B048-85BDC9FD1C3A}</a:tableStyleId>
+              </a:tblPr>
+              <a:tblGrid>
+                <a:gridCol w="1058041">
+                  <a:extLst>
+                    <a:ext uri="{9D8B030D-6E8A-4147-A177-3AD203B41FA5}">
+                      <a16:colId xmlns:a16="http://schemas.microsoft.com/office/drawing/2014/main" val="3275597204"/>
+                    </a:ext>
+                  </a:extLst>
+                </a:gridCol>
+                <a:gridCol w="1566042">
+                  <a:extLst>
+                    <a:ext uri="{9D8B030D-6E8A-4147-A177-3AD203B41FA5}">
+                      <a16:colId xmlns:a16="http://schemas.microsoft.com/office/drawing/2014/main" val="3709253098"/>
+                    </a:ext>
+                  </a:extLst>
+                </a:gridCol>
+                <a:gridCol w="1923393">
+                  <a:extLst>
+                    <a:ext uri="{9D8B030D-6E8A-4147-A177-3AD203B41FA5}">
+                      <a16:colId xmlns:a16="http://schemas.microsoft.com/office/drawing/2014/main" val="3363109013"/>
+                    </a:ext>
+                  </a:extLst>
+                </a:gridCol>
+              </a:tblGrid>
+              <a:tr h="370840">
+                <a:tc>
+                  <a:txBody>
+                    <a:bodyPr/>
+                    <a:lstStyle/>
+                    <a:p>
+                      <a:r>
+                        <a:rPr lang="en-US" dirty="0"/>
+                        <a:t>Address</a:t>
+                      </a:r>
+                    </a:p>
+                  </a:txBody>
+                  <a:tcPr/>
+                </a:tc>
+                <a:tc>
+                  <a:txBody>
+                    <a:bodyPr/>
+                    <a:lstStyle/>
+                    <a:p>
+                      <a:r>
+                        <a:rPr lang="en-US" dirty="0"/>
+                        <a:t>Value</a:t>
+                      </a:r>
+                    </a:p>
+                  </a:txBody>
+                  <a:tcPr/>
+                </a:tc>
+                <a:tc>
+                  <a:txBody>
+                    <a:bodyPr/>
+                    <a:lstStyle/>
+                    <a:p>
+                      <a:r>
+                        <a:rPr lang="en-US" dirty="0"/>
+                        <a:t>Ref. Count</a:t>
+                      </a:r>
+                    </a:p>
+                  </a:txBody>
+                  <a:tcPr/>
+                </a:tc>
+                <a:extLst>
+                  <a:ext uri="{0D108BD9-81ED-4DB2-BD59-A6C34878D82A}">
+                    <a16:rowId xmlns:a16="http://schemas.microsoft.com/office/drawing/2014/main" val="2963666045"/>
+                  </a:ext>
+                </a:extLst>
+              </a:tr>
+              <a:tr h="370840">
+                <a:tc>
+                  <a:txBody>
+                    <a:bodyPr/>
+                    <a:lstStyle/>
+                    <a:p>
+                      <a:r>
+                        <a:rPr lang="en-US" dirty="0"/>
+                        <a:t>0</a:t>
+                      </a:r>
+                    </a:p>
+                  </a:txBody>
+                  <a:tcPr/>
+                </a:tc>
+                <a:tc>
+                  <a:txBody>
+                    <a:bodyPr/>
+                    <a:lstStyle/>
+                    <a:p>
+                      <a:r>
+                        <a:rPr lang="en-US" dirty="0"/>
+                        <a:t>10</a:t>
+                      </a:r>
+                    </a:p>
+                  </a:txBody>
+                  <a:tcPr/>
+                </a:tc>
+                <a:tc>
+                  <a:txBody>
+                    <a:bodyPr/>
+                    <a:lstStyle/>
+                    <a:p>
+                      <a:r>
+                        <a:rPr lang="en-US" dirty="0"/>
+                        <a:t>1</a:t>
+                      </a:r>
+                    </a:p>
+                  </a:txBody>
+                  <a:tcPr/>
+                </a:tc>
+                <a:extLst>
+                  <a:ext uri="{0D108BD9-81ED-4DB2-BD59-A6C34878D82A}">
+                    <a16:rowId xmlns:a16="http://schemas.microsoft.com/office/drawing/2014/main" val="2276613400"/>
+                  </a:ext>
+                </a:extLst>
+              </a:tr>
+              <a:tr h="370840">
+                <a:tc>
+                  <a:txBody>
+                    <a:bodyPr/>
+                    <a:lstStyle/>
+                    <a:p>
+                      <a:r>
+                        <a:rPr lang="en-US" dirty="0"/>
+                        <a:t>1</a:t>
+                      </a:r>
+                    </a:p>
+                  </a:txBody>
+                  <a:tcPr>
+                    <a:solidFill>
+                      <a:schemeClr val="accent6">
+                        <a:lumMod val="40000"/>
+                        <a:lumOff val="60000"/>
+                      </a:schemeClr>
+                    </a:solidFill>
+                  </a:tcPr>
+                </a:tc>
+                <a:tc>
+                  <a:txBody>
+                    <a:bodyPr/>
+                    <a:lstStyle/>
+                    <a:p>
+                      <a:r>
+                        <a:rPr lang="en-US" dirty="0"/>
+                        <a:t>25</a:t>
+                      </a:r>
+                    </a:p>
+                  </a:txBody>
+                  <a:tcPr>
+                    <a:solidFill>
+                      <a:schemeClr val="accent6">
+                        <a:lumMod val="40000"/>
+                        <a:lumOff val="60000"/>
+                      </a:schemeClr>
+                    </a:solidFill>
+                  </a:tcPr>
+                </a:tc>
+                <a:tc>
+                  <a:txBody>
+                    <a:bodyPr/>
+                    <a:lstStyle/>
+                    <a:p>
+                      <a:r>
+                        <a:rPr lang="en-US" dirty="0">
+                          <a:solidFill>
+                            <a:schemeClr val="tx1"/>
+                          </a:solidFill>
+                        </a:rPr>
+                        <a:t>1</a:t>
+                      </a:r>
+                    </a:p>
+                  </a:txBody>
+                  <a:tcPr>
+                    <a:solidFill>
+                      <a:schemeClr val="accent6">
+                        <a:lumMod val="40000"/>
+                        <a:lumOff val="60000"/>
+                      </a:schemeClr>
+                    </a:solidFill>
+                  </a:tcPr>
+                </a:tc>
+                <a:extLst>
+                  <a:ext uri="{0D108BD9-81ED-4DB2-BD59-A6C34878D82A}">
+                    <a16:rowId xmlns:a16="http://schemas.microsoft.com/office/drawing/2014/main" val="476150846"/>
+                  </a:ext>
+                </a:extLst>
+              </a:tr>
+            </a:tbl>
+          </a:graphicData>
+        </a:graphic>
+      </p:graphicFrame>
+    </p:spTree>
+    <p:extLst>
+      <p:ext uri="{BB962C8B-B14F-4D97-AF65-F5344CB8AC3E}">
+        <p14:creationId xmlns:p14="http://schemas.microsoft.com/office/powerpoint/2010/main" val="919805507"/>
       </p:ext>
     </p:extLst>
   </p:cSld>

</xml_diff>